<commit_message>
ing make model validation ppt
</commit_message>
<xml_diff>
--- a/모델검증_평가_정리.pptx
+++ b/모델검증_평가_정리.pptx
@@ -9,22 +9,23 @@
     <p:sldMasterId id="2147484183" r:id="rId5"/>
   </p:sldMasterIdLst>
   <p:notesMasterIdLst>
-    <p:notesMasterId r:id="rId8"/>
+    <p:notesMasterId r:id="rId9"/>
   </p:notesMasterIdLst>
   <p:handoutMasterIdLst>
-    <p:handoutMasterId r:id="rId9"/>
+    <p:handoutMasterId r:id="rId10"/>
   </p:handoutMasterIdLst>
   <p:sldIdLst>
     <p:sldId id="1214" r:id="rId6"/>
     <p:sldId id="1215" r:id="rId7"/>
+    <p:sldId id="1216" r:id="rId8"/>
   </p:sldIdLst>
   <p:sldSz cx="9906000" cy="6858000" type="A4"/>
   <p:notesSz cx="6797675" cy="9928225"/>
   <p:embeddedFontLst>
     <p:embeddedFont>
       <p:font typeface="맑은 고딕" panose="020B0503020000020004" pitchFamily="50" charset="-127"/>
-      <p:regular r:id="rId10"/>
-      <p:bold r:id="rId11"/>
+      <p:regular r:id="rId11"/>
+      <p:bold r:id="rId12"/>
     </p:embeddedFont>
   </p:embeddedFontLst>
   <p:defaultTextStyle>
@@ -9410,10 +9411,654 @@
           <a:chExt cx="0" cy="0"/>
         </a:xfrm>
       </p:grpSpPr>
+      <p:sp>
+        <p:nvSpPr>
+          <p:cNvPr id="6" name="TextBox 5"/>
+          <p:cNvSpPr txBox="1"/>
+          <p:nvPr/>
+        </p:nvSpPr>
+        <p:spPr>
+          <a:xfrm>
+            <a:off x="1136576" y="1196752"/>
+            <a:ext cx="1872208" cy="1815882"/>
+          </a:xfrm>
+          <a:prstGeom prst="rect">
+            <a:avLst/>
+          </a:prstGeom>
+          <a:noFill/>
+        </p:spPr>
+        <p:txBody>
+          <a:bodyPr wrap="square" rtlCol="0">
+            <a:spAutoFit/>
+          </a:bodyPr>
+          <a:lstStyle/>
+          <a:p>
+            <a:r>
+              <a:rPr lang="ko-KR" altLang="en-US" dirty="0" smtClean="0"/>
+              <a:t>선택된 모델이 데이터를 얼마나 정확하게 설명하고 있는지</a:t>
+            </a:r>
+            <a:r>
+              <a:rPr lang="en-US" altLang="ko-KR" dirty="0" smtClean="0"/>
+              <a:t>(</a:t>
+            </a:r>
+            <a:r>
+              <a:rPr lang="ko-KR" altLang="en-US" dirty="0" smtClean="0"/>
+              <a:t>정확성</a:t>
+            </a:r>
+            <a:r>
+              <a:rPr lang="en-US" altLang="ko-KR" dirty="0" smtClean="0"/>
+              <a:t>), </a:t>
+            </a:r>
+            <a:r>
+              <a:rPr lang="ko-KR" altLang="en-US" dirty="0" smtClean="0"/>
+              <a:t>그리고 새로운 데이터에 대해 해당 모델이 얼마나 유사한 결과를 낼 수 있는지</a:t>
+            </a:r>
+            <a:r>
+              <a:rPr lang="en-US" altLang="ko-KR" dirty="0" smtClean="0"/>
+              <a:t>(Robustness)</a:t>
+            </a:r>
+            <a:r>
+              <a:rPr lang="ko-KR" altLang="en-US" dirty="0" smtClean="0"/>
+              <a:t> 판단</a:t>
+            </a:r>
+            <a:endParaRPr lang="ko-KR" altLang="en-US" dirty="0"/>
+          </a:p>
+        </p:txBody>
+      </p:sp>
+      <p:sp>
+        <p:nvSpPr>
+          <p:cNvPr id="7" name="TextBox 6"/>
+          <p:cNvSpPr txBox="1"/>
+          <p:nvPr/>
+        </p:nvSpPr>
+        <p:spPr>
+          <a:xfrm>
+            <a:off x="992560" y="4005064"/>
+            <a:ext cx="1872208" cy="1384995"/>
+          </a:xfrm>
+          <a:prstGeom prst="rect">
+            <a:avLst/>
+          </a:prstGeom>
+          <a:noFill/>
+        </p:spPr>
+        <p:txBody>
+          <a:bodyPr wrap="square" rtlCol="0">
+            <a:spAutoFit/>
+          </a:bodyPr>
+          <a:lstStyle/>
+          <a:p>
+            <a:r>
+              <a:rPr lang="ko-KR" altLang="en-US" dirty="0" smtClean="0"/>
+              <a:t>교차 검증</a:t>
+            </a:r>
+            <a:r>
+              <a:rPr lang="en-US" altLang="ko-KR" dirty="0" smtClean="0"/>
+              <a:t>(</a:t>
+            </a:r>
+            <a:r>
+              <a:rPr lang="en-US" altLang="ko-KR" dirty="0" err="1" smtClean="0"/>
+              <a:t>cross_validation</a:t>
+            </a:r>
+            <a:r>
+              <a:rPr lang="en-US" altLang="ko-KR" dirty="0" smtClean="0"/>
+              <a:t>)</a:t>
+            </a:r>
+          </a:p>
+          <a:p>
+            <a:r>
+              <a:rPr lang="en-US" altLang="ko-KR" dirty="0" smtClean="0"/>
+              <a:t>Overfitting</a:t>
+            </a:r>
+            <a:r>
+              <a:rPr lang="ko-KR" altLang="en-US" dirty="0" smtClean="0"/>
+              <a:t>을 방지하기 위해 </a:t>
+            </a:r>
+            <a:r>
+              <a:rPr lang="ko-KR" altLang="en-US" dirty="0" err="1" smtClean="0"/>
+              <a:t>검증용</a:t>
+            </a:r>
+            <a:r>
+              <a:rPr lang="ko-KR" altLang="en-US" dirty="0" smtClean="0"/>
+              <a:t> 데이터 집합을 만들어 사용한다</a:t>
+            </a:r>
+            <a:r>
+              <a:rPr lang="en-US" altLang="ko-KR" dirty="0" smtClean="0"/>
+              <a:t>.</a:t>
+            </a:r>
+            <a:endParaRPr lang="ko-KR" altLang="en-US" dirty="0"/>
+          </a:p>
+        </p:txBody>
+      </p:sp>
+      <p:sp>
+        <p:nvSpPr>
+          <p:cNvPr id="8" name="TextBox 7"/>
+          <p:cNvSpPr txBox="1"/>
+          <p:nvPr/>
+        </p:nvSpPr>
+        <p:spPr>
+          <a:xfrm>
+            <a:off x="4520952" y="3789040"/>
+            <a:ext cx="1872208" cy="523220"/>
+          </a:xfrm>
+          <a:prstGeom prst="rect">
+            <a:avLst/>
+          </a:prstGeom>
+          <a:noFill/>
+        </p:spPr>
+        <p:txBody>
+          <a:bodyPr wrap="square" rtlCol="0">
+            <a:spAutoFit/>
+          </a:bodyPr>
+          <a:lstStyle/>
+          <a:p>
+            <a:r>
+              <a:rPr lang="en-US" altLang="ko-KR" dirty="0" smtClean="0"/>
+              <a:t>K-fold </a:t>
+            </a:r>
+            <a:r>
+              <a:rPr lang="ko-KR" altLang="en-US" dirty="0" smtClean="0"/>
+              <a:t>교차 검증</a:t>
+            </a:r>
+            <a:endParaRPr lang="en-US" altLang="ko-KR" dirty="0" smtClean="0"/>
+          </a:p>
+          <a:p>
+            <a:endParaRPr lang="en-US" altLang="ko-KR" dirty="0" smtClean="0"/>
+          </a:p>
+        </p:txBody>
+      </p:sp>
+      <p:sp>
+        <p:nvSpPr>
+          <p:cNvPr id="9" name="TextBox 8"/>
+          <p:cNvSpPr txBox="1"/>
+          <p:nvPr/>
+        </p:nvSpPr>
+        <p:spPr>
+          <a:xfrm>
+            <a:off x="4501662" y="4618920"/>
+            <a:ext cx="1872208" cy="1600438"/>
+          </a:xfrm>
+          <a:prstGeom prst="rect">
+            <a:avLst/>
+          </a:prstGeom>
+          <a:noFill/>
+        </p:spPr>
+        <p:txBody>
+          <a:bodyPr wrap="square" rtlCol="0">
+            <a:spAutoFit/>
+          </a:bodyPr>
+          <a:lstStyle/>
+          <a:p>
+            <a:r>
+              <a:rPr lang="ko-KR" altLang="en-US" dirty="0" smtClean="0"/>
+              <a:t>평가 점수</a:t>
+            </a:r>
+            <a:endParaRPr lang="en-US" altLang="ko-KR" dirty="0" smtClean="0"/>
+          </a:p>
+          <a:p>
+            <a:r>
+              <a:rPr lang="en-US" altLang="ko-KR" dirty="0" smtClean="0"/>
+              <a:t>r2_score : </a:t>
+            </a:r>
+            <a:r>
+              <a:rPr lang="ko-KR" altLang="en-US" dirty="0" err="1" smtClean="0"/>
+              <a:t>결정계수</a:t>
+            </a:r>
+            <a:endParaRPr lang="en-US" altLang="ko-KR" dirty="0" smtClean="0"/>
+          </a:p>
+          <a:p>
+            <a:r>
+              <a:rPr lang="en-US" altLang="ko-KR" dirty="0"/>
+              <a:t> </a:t>
+            </a:r>
+            <a:r>
+              <a:rPr lang="en-US" altLang="ko-KR" dirty="0" err="1" smtClean="0"/>
+              <a:t>mean_squared_error</a:t>
+            </a:r>
+            <a:r>
+              <a:rPr lang="en-US" altLang="ko-KR" dirty="0" smtClean="0"/>
+              <a:t>: </a:t>
+            </a:r>
+            <a:r>
+              <a:rPr lang="ko-KR" altLang="en-US" dirty="0" smtClean="0"/>
+              <a:t>평균 제곱 오차</a:t>
+            </a:r>
+            <a:endParaRPr lang="en-US" altLang="ko-KR" dirty="0" smtClean="0"/>
+          </a:p>
+          <a:p>
+            <a:r>
+              <a:rPr lang="en-US" altLang="ko-KR" dirty="0" err="1" smtClean="0"/>
+              <a:t>median_absolute_error</a:t>
+            </a:r>
+            <a:r>
+              <a:rPr lang="en-US" altLang="ko-KR" dirty="0" smtClean="0"/>
+              <a:t>:  </a:t>
+            </a:r>
+            <a:r>
+              <a:rPr lang="ko-KR" altLang="en-US" dirty="0" smtClean="0"/>
+              <a:t>절대 오차 중앙값</a:t>
+            </a:r>
+            <a:endParaRPr lang="en-US" altLang="ko-KR" dirty="0" smtClean="0"/>
+          </a:p>
+        </p:txBody>
+      </p:sp>
+      <p:sp>
+        <p:nvSpPr>
+          <p:cNvPr id="10" name="TextBox 9"/>
+          <p:cNvSpPr txBox="1"/>
+          <p:nvPr/>
+        </p:nvSpPr>
+        <p:spPr>
+          <a:xfrm>
+            <a:off x="8033792" y="1268760"/>
+            <a:ext cx="1872208" cy="954107"/>
+          </a:xfrm>
+          <a:prstGeom prst="rect">
+            <a:avLst/>
+          </a:prstGeom>
+          <a:noFill/>
+        </p:spPr>
+        <p:txBody>
+          <a:bodyPr wrap="square" rtlCol="0">
+            <a:spAutoFit/>
+          </a:bodyPr>
+          <a:lstStyle/>
+          <a:p>
+            <a:r>
+              <a:rPr lang="en-US" altLang="ko-KR" dirty="0" smtClean="0"/>
+              <a:t>confusion matrix</a:t>
+            </a:r>
+          </a:p>
+          <a:p>
+            <a:r>
+              <a:rPr lang="ko-KR" altLang="en-US" dirty="0" smtClean="0"/>
+              <a:t>이진 분류 평가 결과를 나타낼 때 가장 널리 사용하는 방법</a:t>
+            </a:r>
+            <a:endParaRPr lang="ko-KR" altLang="en-US" dirty="0"/>
+          </a:p>
+        </p:txBody>
+      </p:sp>
+      <p:pic>
+        <p:nvPicPr>
+          <p:cNvPr id="11" name="그림 10"/>
+          <p:cNvPicPr>
+            <a:picLocks noChangeAspect="1"/>
+          </p:cNvPicPr>
+          <p:nvPr/>
+        </p:nvPicPr>
+        <p:blipFill>
+          <a:blip r:embed="rId2"/>
+          <a:stretch>
+            <a:fillRect/>
+          </a:stretch>
+        </p:blipFill>
+        <p:spPr>
+          <a:xfrm>
+            <a:off x="7689304" y="2374388"/>
+            <a:ext cx="2052080" cy="1276492"/>
+          </a:xfrm>
+          <a:prstGeom prst="rect">
+            <a:avLst/>
+          </a:prstGeom>
+        </p:spPr>
+      </p:pic>
     </p:spTree>
     <p:extLst>
       <p:ext uri="{BB962C8B-B14F-4D97-AF65-F5344CB8AC3E}">
         <p14:creationId xmlns:p14="http://schemas.microsoft.com/office/powerpoint/2010/main" val="2413400924"/>
+      </p:ext>
+    </p:extLst>
+  </p:cSld>
+  <p:clrMapOvr>
+    <a:masterClrMapping/>
+  </p:clrMapOvr>
+</p:sld>
+</file>
+
+<file path=ppt/slides/slide3.xml><?xml version="1.0" encoding="utf-8"?>
+<p:sld xmlns:a="http://schemas.openxmlformats.org/drawingml/2006/main" xmlns:r="http://schemas.openxmlformats.org/officeDocument/2006/relationships" xmlns:p="http://schemas.openxmlformats.org/presentationml/2006/main">
+  <p:cSld>
+    <p:spTree>
+      <p:nvGrpSpPr>
+        <p:cNvPr id="1" name=""/>
+        <p:cNvGrpSpPr/>
+        <p:nvPr/>
+      </p:nvGrpSpPr>
+      <p:grpSpPr>
+        <a:xfrm>
+          <a:off x="0" y="0"/>
+          <a:ext cx="0" cy="0"/>
+          <a:chOff x="0" y="0"/>
+          <a:chExt cx="0" cy="0"/>
+        </a:xfrm>
+      </p:grpSpPr>
+      <p:sp>
+        <p:nvSpPr>
+          <p:cNvPr id="4" name="슬라이드 번호 개체 틀 3"/>
+          <p:cNvSpPr>
+            <a:spLocks noGrp="1"/>
+          </p:cNvSpPr>
+          <p:nvPr>
+            <p:ph type="sldNum" sz="quarter" idx="12"/>
+          </p:nvPr>
+        </p:nvSpPr>
+        <p:spPr/>
+        <p:txBody>
+          <a:bodyPr/>
+          <a:lstStyle/>
+          <a:p>
+            <a:fld id="{33796E3F-F6B7-490E-938A-9F8EC05675D0}" type="slidenum">
+              <a:rPr lang="ko-KR" altLang="en-US" smtClean="0"/>
+              <a:pPr/>
+              <a:t>2</a:t>
+            </a:fld>
+            <a:endParaRPr lang="ko-KR" altLang="en-US"/>
+          </a:p>
+        </p:txBody>
+      </p:sp>
+      <p:sp>
+        <p:nvSpPr>
+          <p:cNvPr id="5" name="TextBox 4"/>
+          <p:cNvSpPr txBox="1"/>
+          <p:nvPr/>
+        </p:nvSpPr>
+        <p:spPr>
+          <a:xfrm>
+            <a:off x="1136576" y="4437112"/>
+            <a:ext cx="7200800" cy="1600438"/>
+          </a:xfrm>
+          <a:prstGeom prst="rect">
+            <a:avLst/>
+          </a:prstGeom>
+          <a:noFill/>
+        </p:spPr>
+        <p:txBody>
+          <a:bodyPr wrap="square" rtlCol="0">
+            <a:spAutoFit/>
+          </a:bodyPr>
+          <a:lstStyle/>
+          <a:p>
+            <a:r>
+              <a:rPr lang="ko-KR" altLang="en-US" dirty="0" err="1" smtClean="0"/>
+              <a:t>재현율</a:t>
+            </a:r>
+            <a:r>
+              <a:rPr lang="ko-KR" altLang="en-US" dirty="0" smtClean="0"/>
+              <a:t> </a:t>
+            </a:r>
+            <a:r>
+              <a:rPr lang="en-US" altLang="ko-KR" dirty="0" smtClean="0"/>
+              <a:t>= </a:t>
+            </a:r>
+            <a:r>
+              <a:rPr lang="ko-KR" altLang="en-US" dirty="0" smtClean="0"/>
+              <a:t>민감도</a:t>
+            </a:r>
+            <a:r>
+              <a:rPr lang="en-US" altLang="ko-KR" dirty="0" smtClean="0"/>
+              <a:t>, </a:t>
+            </a:r>
+            <a:r>
+              <a:rPr lang="ko-KR" altLang="en-US" dirty="0" smtClean="0"/>
+              <a:t>적중률</a:t>
+            </a:r>
+            <a:r>
+              <a:rPr lang="en-US" altLang="ko-KR" dirty="0" smtClean="0"/>
+              <a:t>, </a:t>
+            </a:r>
+            <a:r>
+              <a:rPr lang="ko-KR" altLang="en-US" dirty="0" smtClean="0"/>
+              <a:t>진짜 양성 비율</a:t>
+            </a:r>
+            <a:endParaRPr lang="en-US" altLang="ko-KR" dirty="0" smtClean="0"/>
+          </a:p>
+          <a:p>
+            <a:r>
+              <a:rPr lang="ko-KR" altLang="en-US" dirty="0" err="1" smtClean="0"/>
+              <a:t>재현율의</a:t>
+            </a:r>
+            <a:r>
+              <a:rPr lang="ko-KR" altLang="en-US" dirty="0" smtClean="0"/>
+              <a:t> 최적화와 정밀도의 최적화는 </a:t>
+            </a:r>
+            <a:r>
+              <a:rPr lang="en-US" altLang="ko-KR" dirty="0" smtClean="0"/>
+              <a:t>‘</a:t>
+            </a:r>
+            <a:r>
+              <a:rPr lang="ko-KR" altLang="en-US" dirty="0" smtClean="0"/>
+              <a:t>상충</a:t>
+            </a:r>
+            <a:r>
+              <a:rPr lang="en-US" altLang="ko-KR" dirty="0" smtClean="0"/>
+              <a:t>’</a:t>
+            </a:r>
+          </a:p>
+          <a:p>
+            <a:endParaRPr lang="en-US" altLang="ko-KR" dirty="0"/>
+          </a:p>
+          <a:p>
+            <a:r>
+              <a:rPr lang="en-US" altLang="ko-KR" dirty="0" smtClean="0"/>
+              <a:t>if&gt;  </a:t>
+            </a:r>
+            <a:r>
+              <a:rPr lang="en-US" altLang="ko-KR" dirty="0" err="1" smtClean="0"/>
+              <a:t>fn</a:t>
+            </a:r>
+            <a:r>
+              <a:rPr lang="ko-KR" altLang="en-US" dirty="0" smtClean="0"/>
+              <a:t>을 없애서 </a:t>
+            </a:r>
+            <a:r>
+              <a:rPr lang="en-US" altLang="ko-KR" dirty="0" smtClean="0">
+                <a:sym typeface="Wingdings" panose="05000000000000000000" pitchFamily="2" charset="2"/>
+              </a:rPr>
+              <a:t> </a:t>
+            </a:r>
+            <a:r>
+              <a:rPr lang="ko-KR" altLang="en-US" dirty="0" err="1" smtClean="0">
+                <a:sym typeface="Wingdings" panose="05000000000000000000" pitchFamily="2" charset="2"/>
+              </a:rPr>
+              <a:t>재현율</a:t>
+            </a:r>
+            <a:r>
+              <a:rPr lang="ko-KR" altLang="en-US" dirty="0" smtClean="0">
+                <a:sym typeface="Wingdings" panose="05000000000000000000" pitchFamily="2" charset="2"/>
+              </a:rPr>
+              <a:t> 완벽 </a:t>
+            </a:r>
+            <a:r>
+              <a:rPr lang="en-US" altLang="ko-KR" dirty="0" smtClean="0">
+                <a:sym typeface="Wingdings" panose="05000000000000000000" pitchFamily="2" charset="2"/>
+              </a:rPr>
+              <a:t> </a:t>
+            </a:r>
+            <a:r>
+              <a:rPr lang="ko-KR" altLang="en-US" dirty="0" smtClean="0">
+                <a:sym typeface="Wingdings" panose="05000000000000000000" pitchFamily="2" charset="2"/>
+              </a:rPr>
+              <a:t>샘플 양성으로 예측하면 </a:t>
+            </a:r>
+            <a:r>
+              <a:rPr lang="en-US" altLang="ko-KR" dirty="0" smtClean="0">
+                <a:sym typeface="Wingdings" panose="05000000000000000000" pitchFamily="2" charset="2"/>
+              </a:rPr>
+              <a:t> FP </a:t>
+            </a:r>
+            <a:r>
+              <a:rPr lang="ko-KR" altLang="en-US" dirty="0" smtClean="0">
+                <a:sym typeface="Wingdings" panose="05000000000000000000" pitchFamily="2" charset="2"/>
+              </a:rPr>
+              <a:t>증가 </a:t>
+            </a:r>
+            <a:r>
+              <a:rPr lang="en-US" altLang="ko-KR" dirty="0" smtClean="0">
+                <a:sym typeface="Wingdings" panose="05000000000000000000" pitchFamily="2" charset="2"/>
+              </a:rPr>
+              <a:t> </a:t>
+            </a:r>
+            <a:r>
+              <a:rPr lang="ko-KR" altLang="en-US" dirty="0" smtClean="0">
+                <a:sym typeface="Wingdings" panose="05000000000000000000" pitchFamily="2" charset="2"/>
+              </a:rPr>
+              <a:t>정밀도 떨어짐</a:t>
+            </a:r>
+            <a:endParaRPr lang="en-US" altLang="ko-KR" dirty="0" smtClean="0">
+              <a:sym typeface="Wingdings" panose="05000000000000000000" pitchFamily="2" charset="2"/>
+            </a:endParaRPr>
+          </a:p>
+          <a:p>
+            <a:r>
+              <a:rPr lang="en-US" altLang="ko-KR" dirty="0" smtClean="0">
+                <a:sym typeface="Wingdings" panose="05000000000000000000" pitchFamily="2" charset="2"/>
+              </a:rPr>
+              <a:t>FP</a:t>
+            </a:r>
+            <a:r>
+              <a:rPr lang="ko-KR" altLang="en-US" dirty="0" smtClean="0">
+                <a:sym typeface="Wingdings" panose="05000000000000000000" pitchFamily="2" charset="2"/>
+              </a:rPr>
+              <a:t>를 없애면 </a:t>
+            </a:r>
+            <a:r>
+              <a:rPr lang="en-US" altLang="ko-KR" dirty="0" smtClean="0">
+                <a:sym typeface="Wingdings" panose="05000000000000000000" pitchFamily="2" charset="2"/>
+              </a:rPr>
+              <a:t> </a:t>
+            </a:r>
+            <a:r>
+              <a:rPr lang="ko-KR" altLang="en-US" dirty="0" smtClean="0">
+                <a:sym typeface="Wingdings" panose="05000000000000000000" pitchFamily="2" charset="2"/>
+              </a:rPr>
+              <a:t>정밀도 완벽 </a:t>
+            </a:r>
+            <a:r>
+              <a:rPr lang="en-US" altLang="ko-KR" dirty="0" smtClean="0">
+                <a:sym typeface="Wingdings" panose="05000000000000000000" pitchFamily="2" charset="2"/>
+              </a:rPr>
+              <a:t> </a:t>
+            </a:r>
+            <a:r>
+              <a:rPr lang="ko-KR" altLang="en-US" dirty="0" err="1" smtClean="0">
+                <a:sym typeface="Wingdings" panose="05000000000000000000" pitchFamily="2" charset="2"/>
+              </a:rPr>
+              <a:t>재현율</a:t>
+            </a:r>
+            <a:r>
+              <a:rPr lang="ko-KR" altLang="en-US" dirty="0" smtClean="0">
+                <a:sym typeface="Wingdings" panose="05000000000000000000" pitchFamily="2" charset="2"/>
+              </a:rPr>
+              <a:t> 떨어짐</a:t>
+            </a:r>
+            <a:endParaRPr lang="en-US" altLang="ko-KR" dirty="0" smtClean="0">
+              <a:sym typeface="Wingdings" panose="05000000000000000000" pitchFamily="2" charset="2"/>
+            </a:endParaRPr>
+          </a:p>
+          <a:p>
+            <a:endParaRPr lang="en-US" altLang="ko-KR" dirty="0">
+              <a:sym typeface="Wingdings" panose="05000000000000000000" pitchFamily="2" charset="2"/>
+            </a:endParaRPr>
+          </a:p>
+          <a:p>
+            <a:r>
+              <a:rPr lang="en-US" altLang="ko-KR" dirty="0" smtClean="0">
+                <a:sym typeface="Wingdings" panose="05000000000000000000" pitchFamily="2" charset="2"/>
+              </a:rPr>
+              <a:t> </a:t>
+            </a:r>
+            <a:r>
+              <a:rPr lang="ko-KR" altLang="en-US" dirty="0" smtClean="0">
+                <a:sym typeface="Wingdings" panose="05000000000000000000" pitchFamily="2" charset="2"/>
+              </a:rPr>
+              <a:t>정밀도와 </a:t>
+            </a:r>
+            <a:r>
+              <a:rPr lang="ko-KR" altLang="en-US" dirty="0" err="1" smtClean="0">
+                <a:sym typeface="Wingdings" panose="05000000000000000000" pitchFamily="2" charset="2"/>
+              </a:rPr>
+              <a:t>재현율의</a:t>
+            </a:r>
+            <a:r>
+              <a:rPr lang="ko-KR" altLang="en-US" dirty="0" smtClean="0">
+                <a:sym typeface="Wingdings" panose="05000000000000000000" pitchFamily="2" charset="2"/>
+              </a:rPr>
+              <a:t> 조화 평균인 </a:t>
+            </a:r>
+            <a:r>
+              <a:rPr lang="en-US" altLang="ko-KR" dirty="0" smtClean="0">
+                <a:sym typeface="Wingdings" panose="05000000000000000000" pitchFamily="2" charset="2"/>
+              </a:rPr>
+              <a:t>f-score </a:t>
+            </a:r>
+            <a:r>
+              <a:rPr lang="ko-KR" altLang="en-US" dirty="0" smtClean="0">
+                <a:sym typeface="Wingdings" panose="05000000000000000000" pitchFamily="2" charset="2"/>
+              </a:rPr>
+              <a:t>사용</a:t>
+            </a:r>
+            <a:endParaRPr lang="ko-KR" altLang="en-US" dirty="0"/>
+          </a:p>
+        </p:txBody>
+      </p:sp>
+      <p:pic>
+        <p:nvPicPr>
+          <p:cNvPr id="6" name="그림 5"/>
+          <p:cNvPicPr>
+            <a:picLocks noChangeAspect="1"/>
+          </p:cNvPicPr>
+          <p:nvPr/>
+        </p:nvPicPr>
+        <p:blipFill>
+          <a:blip r:embed="rId2"/>
+          <a:stretch>
+            <a:fillRect/>
+          </a:stretch>
+        </p:blipFill>
+        <p:spPr>
+          <a:xfrm>
+            <a:off x="1280592" y="1052736"/>
+            <a:ext cx="5069508" cy="2983450"/>
+          </a:xfrm>
+          <a:prstGeom prst="rect">
+            <a:avLst/>
+          </a:prstGeom>
+        </p:spPr>
+      </p:pic>
+      <p:sp>
+        <p:nvSpPr>
+          <p:cNvPr id="7" name="직사각형 6"/>
+          <p:cNvSpPr/>
+          <p:nvPr/>
+        </p:nvSpPr>
+        <p:spPr>
+          <a:xfrm>
+            <a:off x="56456" y="6858000"/>
+            <a:ext cx="3100529" cy="307777"/>
+          </a:xfrm>
+          <a:prstGeom prst="rect">
+            <a:avLst/>
+          </a:prstGeom>
+        </p:spPr>
+        <p:txBody>
+          <a:bodyPr wrap="none">
+            <a:spAutoFit/>
+          </a:bodyPr>
+          <a:lstStyle/>
+          <a:p>
+            <a:r>
+              <a:rPr lang="en-US" altLang="ko-KR" dirty="0">
+                <a:hlinkClick r:id="rId3"/>
+              </a:rPr>
+              <a:t>https://data-newbie.tistory.com/31</a:t>
+            </a:r>
+            <a:endParaRPr lang="ko-KR" altLang="en-US" dirty="0"/>
+          </a:p>
+        </p:txBody>
+      </p:sp>
+    </p:spTree>
+    <p:extLst>
+      <p:ext uri="{BB962C8B-B14F-4D97-AF65-F5344CB8AC3E}">
+        <p14:creationId xmlns:p14="http://schemas.microsoft.com/office/powerpoint/2010/main" val="290706235"/>
       </p:ext>
     </p:extLst>
   </p:cSld>

</xml_diff>